<commit_message>
, zu . in der ppp auf meinen Seiten
</commit_message>
<xml_diff>
--- a/Homework_Jacqueline/Neuroinformatic/Assignment 1/Task12_Group30.pptx
+++ b/Homework_Jacqueline/Neuroinformatic/Assignment 1/Task12_Group30.pptx
@@ -198,6 +198,69 @@
 
 <file path=ppt/changesInfos/changesInfo1.xml><?xml version="1.0" encoding="utf-8"?>
 <pc:chgInfo xmlns:a="http://schemas.openxmlformats.org/drawingml/2006/main" xmlns:r="http://schemas.openxmlformats.org/officeDocument/2006/relationships" xmlns:ac="http://schemas.microsoft.com/office/drawing/2013/main/command" xmlns:pc="http://schemas.microsoft.com/office/powerpoint/2013/main/command">
+  <pc:docChgLst>
+    <pc:chgData name="Jacqueline N" userId="7febc520ade5fca9" providerId="LiveId" clId="{4D1AB832-94C7-4877-87F7-6F375BD56F3E}"/>
+    <pc:docChg chg="modSld">
+      <pc:chgData name="Jacqueline N" userId="7febc520ade5fca9" providerId="LiveId" clId="{4D1AB832-94C7-4877-87F7-6F375BD56F3E}" dt="2020-12-02T15:52:10.406" v="51" actId="20577"/>
+      <pc:docMkLst>
+        <pc:docMk/>
+      </pc:docMkLst>
+      <pc:sldChg chg="modSp mod">
+        <pc:chgData name="Jacqueline N" userId="7febc520ade5fca9" providerId="LiveId" clId="{4D1AB832-94C7-4877-87F7-6F375BD56F3E}" dt="2020-12-02T15:51:10.360" v="17" actId="20577"/>
+        <pc:sldMkLst>
+          <pc:docMk/>
+          <pc:sldMk cId="4030414985" sldId="469"/>
+        </pc:sldMkLst>
+        <pc:graphicFrameChg chg="modGraphic">
+          <ac:chgData name="Jacqueline N" userId="7febc520ade5fca9" providerId="LiveId" clId="{4D1AB832-94C7-4877-87F7-6F375BD56F3E}" dt="2020-12-02T15:51:10.360" v="17" actId="20577"/>
+          <ac:graphicFrameMkLst>
+            <pc:docMk/>
+            <pc:sldMk cId="4030414985" sldId="469"/>
+            <ac:graphicFrameMk id="7" creationId="{537599E6-E5FE-450B-8BEE-FD0C8A8E5645}"/>
+          </ac:graphicFrameMkLst>
+        </pc:graphicFrameChg>
+      </pc:sldChg>
+      <pc:sldChg chg="modSp mod">
+        <pc:chgData name="Jacqueline N" userId="7febc520ade5fca9" providerId="LiveId" clId="{4D1AB832-94C7-4877-87F7-6F375BD56F3E}" dt="2020-12-02T15:52:10.406" v="51" actId="20577"/>
+        <pc:sldMkLst>
+          <pc:docMk/>
+          <pc:sldMk cId="1601256795" sldId="471"/>
+        </pc:sldMkLst>
+        <pc:graphicFrameChg chg="modGraphic">
+          <ac:chgData name="Jacqueline N" userId="7febc520ade5fca9" providerId="LiveId" clId="{4D1AB832-94C7-4877-87F7-6F375BD56F3E}" dt="2020-12-02T15:51:32.547" v="29" actId="20577"/>
+          <ac:graphicFrameMkLst>
+            <pc:docMk/>
+            <pc:sldMk cId="1601256795" sldId="471"/>
+            <ac:graphicFrameMk id="2" creationId="{A181F042-887B-4031-B59C-5AF4C3D303D4}"/>
+          </ac:graphicFrameMkLst>
+        </pc:graphicFrameChg>
+        <pc:graphicFrameChg chg="modGraphic">
+          <ac:chgData name="Jacqueline N" userId="7febc520ade5fca9" providerId="LiveId" clId="{4D1AB832-94C7-4877-87F7-6F375BD56F3E}" dt="2020-12-02T15:51:23.128" v="21" actId="20577"/>
+          <ac:graphicFrameMkLst>
+            <pc:docMk/>
+            <pc:sldMk cId="1601256795" sldId="471"/>
+            <ac:graphicFrameMk id="7" creationId="{12129A62-7DC2-4843-A8E3-25E9998FD021}"/>
+          </ac:graphicFrameMkLst>
+        </pc:graphicFrameChg>
+        <pc:graphicFrameChg chg="modGraphic">
+          <ac:chgData name="Jacqueline N" userId="7febc520ade5fca9" providerId="LiveId" clId="{4D1AB832-94C7-4877-87F7-6F375BD56F3E}" dt="2020-12-02T15:52:10.406" v="51" actId="20577"/>
+          <ac:graphicFrameMkLst>
+            <pc:docMk/>
+            <pc:sldMk cId="1601256795" sldId="471"/>
+            <ac:graphicFrameMk id="26" creationId="{EB9D7C16-AE5F-402A-81E0-10105BD261E9}"/>
+          </ac:graphicFrameMkLst>
+        </pc:graphicFrameChg>
+        <pc:graphicFrameChg chg="modGraphic">
+          <ac:chgData name="Jacqueline N" userId="7febc520ade5fca9" providerId="LiveId" clId="{4D1AB832-94C7-4877-87F7-6F375BD56F3E}" dt="2020-12-02T15:51:59.143" v="43" actId="20577"/>
+          <ac:graphicFrameMkLst>
+            <pc:docMk/>
+            <pc:sldMk cId="1601256795" sldId="471"/>
+            <ac:graphicFrameMk id="28" creationId="{D1D754F9-06E0-4477-B661-E2F2C1BCBB6C}"/>
+          </ac:graphicFrameMkLst>
+        </pc:graphicFrameChg>
+      </pc:sldChg>
+    </pc:docChg>
+  </pc:docChgLst>
   <pc:docChgLst>
     <pc:chgData name="Jacqueline N" userId="7febc520ade5fca9" providerId="LiveId" clId="{3D8F32A9-9F9D-4561-BC01-02654E30BD83}"/>
     <pc:docChg chg="delSld">
@@ -1287,7 +1350,7 @@
               <a:pPr>
                 <a:defRPr/>
               </a:pPr>
-              <a:t>25.11.2020</a:t>
+              <a:t>02.12.2020</a:t>
             </a:fld>
             <a:endParaRPr lang="de-DE"/>
           </a:p>
@@ -1528,7 +1591,7 @@
               <a:pPr>
                 <a:defRPr/>
               </a:pPr>
-              <a:t>11/25/2020</a:t>
+              <a:t>12/2/2020</a:t>
             </a:fld>
             <a:endParaRPr lang="en-GB"/>
           </a:p>
@@ -6357,8 +6420,8 @@
           </a:p>
         </p:txBody>
       </p:sp>
-      <mc:AlternateContent xmlns:mc="http://schemas.openxmlformats.org/markup-compatibility/2006">
-        <mc:Choice xmlns:a14="http://schemas.microsoft.com/office/drawing/2010/main" Requires="a14">
+      <mc:AlternateContent xmlns:mc="http://schemas.openxmlformats.org/markup-compatibility/2006" xmlns:a14="http://schemas.microsoft.com/office/drawing/2010/main">
+        <mc:Choice Requires="a14">
           <p:sp>
             <p:nvSpPr>
               <p:cNvPr id="21" name="Textfeld 20">
@@ -6532,20 +6595,7 @@
                           <a:latin typeface="+mj-lt"/>
                           <a:cs typeface="Calibri" panose="020F0502020204030204" pitchFamily="34" charset="0"/>
                         </a:rPr>
-                        <m:t>1</m:t>
-                      </m:r>
-                      <m:r>
-                        <m:rPr>
-                          <m:nor/>
-                        </m:rPr>
-                        <a:rPr lang="en-AU" u="sng" smtClean="0">
-                          <a:solidFill>
-                            <a:srgbClr val="000000"/>
-                          </a:solidFill>
-                          <a:latin typeface="+mj-lt"/>
-                          <a:cs typeface="Calibri" panose="020F0502020204030204" pitchFamily="34" charset="0"/>
-                        </a:rPr>
-                        <m:t>. </m:t>
+                        <m:t>1. </m:t>
                       </m:r>
                       <m:r>
                         <m:rPr>
@@ -6965,7 +7015,7 @@
             </p:txBody>
           </p:sp>
         </mc:Choice>
-        <mc:Fallback>
+        <mc:Fallback xmlns="">
           <p:sp>
             <p:nvSpPr>
               <p:cNvPr id="21" name="Textfeld 20">
@@ -7013,8 +7063,8 @@
           </p:sp>
         </mc:Fallback>
       </mc:AlternateContent>
-      <mc:AlternateContent xmlns:mc="http://schemas.openxmlformats.org/markup-compatibility/2006">
-        <mc:Choice xmlns:a14="http://schemas.microsoft.com/office/drawing/2010/main" Requires="a14">
+      <mc:AlternateContent xmlns:mc="http://schemas.openxmlformats.org/markup-compatibility/2006" xmlns:a14="http://schemas.microsoft.com/office/drawing/2010/main">
+        <mc:Choice Requires="a14">
           <p:sp>
             <p:nvSpPr>
               <p:cNvPr id="14" name="Textfeld 13">
@@ -7720,7 +7770,7 @@
             </p:txBody>
           </p:sp>
         </mc:Choice>
-        <mc:Fallback>
+        <mc:Fallback xmlns="">
           <p:sp>
             <p:nvSpPr>
               <p:cNvPr id="14" name="Textfeld 13">
@@ -8100,8 +8150,8 @@
           <a:chExt cx="0" cy="0"/>
         </a:xfrm>
       </p:grpSpPr>
-      <mc:AlternateContent xmlns:mc="http://schemas.openxmlformats.org/markup-compatibility/2006">
-        <mc:Choice xmlns:a14="http://schemas.microsoft.com/office/drawing/2010/main" Requires="a14">
+      <mc:AlternateContent xmlns:mc="http://schemas.openxmlformats.org/markup-compatibility/2006" xmlns:a14="http://schemas.microsoft.com/office/drawing/2010/main">
+        <mc:Choice Requires="a14">
           <p:sp>
             <p:nvSpPr>
               <p:cNvPr id="20" name="Textfeld 19">
@@ -10045,7 +10095,7 @@
             </p:txBody>
           </p:sp>
         </mc:Choice>
-        <mc:Fallback>
+        <mc:Fallback xmlns="">
           <p:sp>
             <p:nvSpPr>
               <p:cNvPr id="20" name="Textfeld 19">
@@ -20311,8 +20361,8 @@
           </a:p>
         </p:txBody>
       </p:sp>
-      <mc:AlternateContent xmlns:mc="http://schemas.openxmlformats.org/markup-compatibility/2006" xmlns:a14="http://schemas.microsoft.com/office/drawing/2010/main">
-        <mc:Choice Requires="a14">
+      <mc:AlternateContent xmlns:mc="http://schemas.openxmlformats.org/markup-compatibility/2006">
+        <mc:Choice xmlns:a14="http://schemas.microsoft.com/office/drawing/2010/main" Requires="a14">
           <p:graphicFrame>
             <p:nvGraphicFramePr>
               <p:cNvPr id="7" name="Tabelle 8">
@@ -20328,7 +20378,7 @@
               <p:nvPr>
                 <p:extLst>
                   <p:ext uri="{D42A27DB-BD31-4B8C-83A1-F6EECF244321}">
-                    <p14:modId xmlns:p14="http://schemas.microsoft.com/office/powerpoint/2010/main" val="2660730280"/>
+                    <p14:modId xmlns:p14="http://schemas.microsoft.com/office/powerpoint/2010/main" val="2564377402"/>
                   </p:ext>
                 </p:extLst>
               </p:nvPr>
@@ -20687,7 +20737,7 @@
                           <a:pPr algn="ctr"/>
                           <a:r>
                             <a:rPr lang="en-GB" sz="1800" noProof="0" dirty="0"/>
-                            <a:t>1,0</a:t>
+                            <a:t>1.0</a:t>
                           </a:r>
                         </a:p>
                       </a:txBody>
@@ -20750,7 +20800,7 @@
                           <a:pPr algn="ctr"/>
                           <a:r>
                             <a:rPr lang="en-GB" sz="1800" noProof="0" dirty="0"/>
-                            <a:t>0,9</a:t>
+                            <a:t>0.9</a:t>
                           </a:r>
                         </a:p>
                       </a:txBody>
@@ -20764,7 +20814,7 @@
                           <a:pPr algn="ctr"/>
                           <a:r>
                             <a:rPr lang="en-GB" sz="1800" noProof="0" dirty="0"/>
-                            <a:t>0,1</a:t>
+                            <a:t>0.1</a:t>
                           </a:r>
                         </a:p>
                       </a:txBody>
@@ -20813,7 +20863,7 @@
                           <a:pPr algn="ctr"/>
                           <a:r>
                             <a:rPr lang="en-GB" sz="1800" noProof="0" dirty="0"/>
-                            <a:t>0,9</a:t>
+                            <a:t>0.9</a:t>
                           </a:r>
                         </a:p>
                       </a:txBody>
@@ -20827,7 +20877,7 @@
                           <a:pPr algn="ctr"/>
                           <a:r>
                             <a:rPr lang="en-GB" sz="1800" noProof="0" dirty="0"/>
-                            <a:t>0,1</a:t>
+                            <a:t>0.1</a:t>
                           </a:r>
                         </a:p>
                       </a:txBody>
@@ -20876,7 +20926,7 @@
                           <a:pPr algn="ctr"/>
                           <a:r>
                             <a:rPr lang="en-GB" sz="1800" noProof="0" dirty="0"/>
-                            <a:t>0,01</a:t>
+                            <a:t>0.01</a:t>
                           </a:r>
                         </a:p>
                       </a:txBody>
@@ -20890,7 +20940,7 @@
                           <a:pPr algn="ctr"/>
                           <a:r>
                             <a:rPr lang="en-GB" sz="1800" noProof="0" dirty="0"/>
-                            <a:t>0,99</a:t>
+                            <a:t>0.99</a:t>
                           </a:r>
                         </a:p>
                       </a:txBody>
@@ -20907,7 +20957,7 @@
             </a:graphic>
           </p:graphicFrame>
         </mc:Choice>
-        <mc:Fallback xmlns="">
+        <mc:Fallback>
           <p:graphicFrame>
             <p:nvGraphicFramePr>
               <p:cNvPr id="7" name="Tabelle 8">
@@ -20923,7 +20973,7 @@
               <p:nvPr>
                 <p:extLst>
                   <p:ext uri="{D42A27DB-BD31-4B8C-83A1-F6EECF244321}">
-                    <p14:modId xmlns:p14="http://schemas.microsoft.com/office/powerpoint/2010/main" val="2660730280"/>
+                    <p14:modId xmlns:p14="http://schemas.microsoft.com/office/powerpoint/2010/main" val="2564377402"/>
                   </p:ext>
                 </p:extLst>
               </p:nvPr>
@@ -21080,7 +21130,7 @@
                           <a:pPr algn="ctr"/>
                           <a:r>
                             <a:rPr lang="en-GB" sz="1800" noProof="0" dirty="0"/>
-                            <a:t>1,0</a:t>
+                            <a:t>1.0</a:t>
                           </a:r>
                         </a:p>
                       </a:txBody>
@@ -21143,7 +21193,7 @@
                           <a:pPr algn="ctr"/>
                           <a:r>
                             <a:rPr lang="en-GB" sz="1800" noProof="0" dirty="0"/>
-                            <a:t>0,9</a:t>
+                            <a:t>0.9</a:t>
                           </a:r>
                         </a:p>
                       </a:txBody>
@@ -21157,7 +21207,7 @@
                           <a:pPr algn="ctr"/>
                           <a:r>
                             <a:rPr lang="en-GB" sz="1800" noProof="0" dirty="0"/>
-                            <a:t>0,1</a:t>
+                            <a:t>0.1</a:t>
                           </a:r>
                         </a:p>
                       </a:txBody>
@@ -21206,7 +21256,7 @@
                           <a:pPr algn="ctr"/>
                           <a:r>
                             <a:rPr lang="en-GB" sz="1800" noProof="0" dirty="0"/>
-                            <a:t>0,9</a:t>
+                            <a:t>0.9</a:t>
                           </a:r>
                         </a:p>
                       </a:txBody>
@@ -21220,7 +21270,7 @@
                           <a:pPr algn="ctr"/>
                           <a:r>
                             <a:rPr lang="en-GB" sz="1800" noProof="0" dirty="0"/>
-                            <a:t>0,1</a:t>
+                            <a:t>0.1</a:t>
                           </a:r>
                         </a:p>
                       </a:txBody>
@@ -21269,7 +21319,7 @@
                           <a:pPr algn="ctr"/>
                           <a:r>
                             <a:rPr lang="en-GB" sz="1800" noProof="0" dirty="0"/>
-                            <a:t>0,01</a:t>
+                            <a:t>0.01</a:t>
                           </a:r>
                         </a:p>
                       </a:txBody>
@@ -21283,7 +21333,7 @@
                           <a:pPr algn="ctr"/>
                           <a:r>
                             <a:rPr lang="en-GB" sz="1800" noProof="0" dirty="0"/>
-                            <a:t>0,99</a:t>
+                            <a:t>0.99</a:t>
                           </a:r>
                         </a:p>
                       </a:txBody>
@@ -24054,8 +24104,8 @@
           </a:p>
         </p:txBody>
       </p:sp>
-      <mc:AlternateContent xmlns:mc="http://schemas.openxmlformats.org/markup-compatibility/2006" xmlns:a14="http://schemas.microsoft.com/office/drawing/2010/main">
-        <mc:Choice Requires="a14">
+      <mc:AlternateContent xmlns:mc="http://schemas.openxmlformats.org/markup-compatibility/2006">
+        <mc:Choice xmlns:a14="http://schemas.microsoft.com/office/drawing/2010/main" Requires="a14">
           <p:graphicFrame>
             <p:nvGraphicFramePr>
               <p:cNvPr id="2" name="Tabelle 8">
@@ -24071,7 +24121,7 @@
               <p:nvPr>
                 <p:extLst>
                   <p:ext uri="{D42A27DB-BD31-4B8C-83A1-F6EECF244321}">
-                    <p14:modId xmlns:p14="http://schemas.microsoft.com/office/powerpoint/2010/main" val="1351173698"/>
+                    <p14:modId xmlns:p14="http://schemas.microsoft.com/office/powerpoint/2010/main" val="452135858"/>
                   </p:ext>
                 </p:extLst>
               </p:nvPr>
@@ -24360,7 +24410,7 @@
                           <a:pPr algn="ctr"/>
                           <a:r>
                             <a:rPr lang="en-GB" sz="1300" noProof="0" dirty="0"/>
-                            <a:t>0,1</a:t>
+                            <a:t>0.1</a:t>
                           </a:r>
                         </a:p>
                       </a:txBody>
@@ -24373,8 +24423,8 @@
                         <a:p>
                           <a:pPr algn="ctr"/>
                           <a:r>
-                            <a:rPr lang="en-GB" sz="1300" noProof="0"/>
-                            <a:t>0,9</a:t>
+                            <a:rPr lang="en-GB" sz="1300" noProof="0" dirty="0"/>
+                            <a:t>0.9</a:t>
                           </a:r>
                         </a:p>
                       </a:txBody>
@@ -24409,7 +24459,7 @@
                           <a:pPr algn="ctr"/>
                           <a:r>
                             <a:rPr lang="en-GB" sz="1300" noProof="0" dirty="0"/>
-                            <a:t>0,8</a:t>
+                            <a:t>0.8</a:t>
                           </a:r>
                         </a:p>
                       </a:txBody>
@@ -24423,7 +24473,7 @@
                           <a:pPr algn="ctr"/>
                           <a:r>
                             <a:rPr lang="en-GB" sz="1300" noProof="0" dirty="0"/>
-                            <a:t>0,2</a:t>
+                            <a:t>0.2</a:t>
                           </a:r>
                         </a:p>
                       </a:txBody>
@@ -24440,7 +24490,7 @@
             </a:graphic>
           </p:graphicFrame>
         </mc:Choice>
-        <mc:Fallback xmlns="">
+        <mc:Fallback>
           <p:graphicFrame>
             <p:nvGraphicFramePr>
               <p:cNvPr id="2" name="Tabelle 8">
@@ -24456,7 +24506,7 @@
               <p:nvPr>
                 <p:extLst>
                   <p:ext uri="{D42A27DB-BD31-4B8C-83A1-F6EECF244321}">
-                    <p14:modId xmlns:p14="http://schemas.microsoft.com/office/powerpoint/2010/main" val="1351173698"/>
+                    <p14:modId xmlns:p14="http://schemas.microsoft.com/office/powerpoint/2010/main" val="452135858"/>
                   </p:ext>
                 </p:extLst>
               </p:nvPr>
@@ -24575,7 +24625,7 @@
                           <a:pPr algn="ctr"/>
                           <a:r>
                             <a:rPr lang="en-GB" sz="1300" noProof="0" dirty="0"/>
-                            <a:t>0,1</a:t>
+                            <a:t>0.1</a:t>
                           </a:r>
                         </a:p>
                       </a:txBody>
@@ -24588,8 +24638,8 @@
                         <a:p>
                           <a:pPr algn="ctr"/>
                           <a:r>
-                            <a:rPr lang="en-GB" sz="1300" noProof="0"/>
-                            <a:t>0,9</a:t>
+                            <a:rPr lang="en-GB" sz="1300" noProof="0" dirty="0"/>
+                            <a:t>0.9</a:t>
                           </a:r>
                         </a:p>
                       </a:txBody>
@@ -24624,7 +24674,7 @@
                           <a:pPr algn="ctr"/>
                           <a:r>
                             <a:rPr lang="en-GB" sz="1300" noProof="0" dirty="0"/>
-                            <a:t>0,8</a:t>
+                            <a:t>0.8</a:t>
                           </a:r>
                         </a:p>
                       </a:txBody>
@@ -24638,7 +24688,7 @@
                           <a:pPr algn="ctr"/>
                           <a:r>
                             <a:rPr lang="en-GB" sz="1300" noProof="0" dirty="0"/>
-                            <a:t>0,2</a:t>
+                            <a:t>0.2</a:t>
                           </a:r>
                         </a:p>
                       </a:txBody>
@@ -25812,8 +25862,8 @@
           </mc:AlternateContent>
         </p:grpSp>
       </p:grpSp>
-      <mc:AlternateContent xmlns:mc="http://schemas.openxmlformats.org/markup-compatibility/2006" xmlns:a14="http://schemas.microsoft.com/office/drawing/2010/main">
-        <mc:Choice Requires="a14">
+      <mc:AlternateContent xmlns:mc="http://schemas.openxmlformats.org/markup-compatibility/2006">
+        <mc:Choice xmlns:a14="http://schemas.microsoft.com/office/drawing/2010/main" Requires="a14">
           <p:graphicFrame>
             <p:nvGraphicFramePr>
               <p:cNvPr id="7" name="Tabelle 8">
@@ -25829,7 +25879,7 @@
               <p:nvPr>
                 <p:extLst>
                   <p:ext uri="{D42A27DB-BD31-4B8C-83A1-F6EECF244321}">
-                    <p14:modId xmlns:p14="http://schemas.microsoft.com/office/powerpoint/2010/main" val="1388748266"/>
+                    <p14:modId xmlns:p14="http://schemas.microsoft.com/office/powerpoint/2010/main" val="190012407"/>
                   </p:ext>
                 </p:extLst>
               </p:nvPr>
@@ -26048,7 +26098,7 @@
                           <a:pPr algn="ctr"/>
                           <a:r>
                             <a:rPr lang="de-DE" sz="1300" dirty="0"/>
-                            <a:t>0,5</a:t>
+                            <a:t>0.5</a:t>
                           </a:r>
                         </a:p>
                       </a:txBody>
@@ -26062,7 +26112,7 @@
                           <a:pPr algn="ctr"/>
                           <a:r>
                             <a:rPr lang="de-DE" sz="1300" dirty="0"/>
-                            <a:t>0,5</a:t>
+                            <a:t>0.5</a:t>
                           </a:r>
                         </a:p>
                       </a:txBody>
@@ -26079,7 +26129,7 @@
             </a:graphic>
           </p:graphicFrame>
         </mc:Choice>
-        <mc:Fallback xmlns="">
+        <mc:Fallback>
           <p:graphicFrame>
             <p:nvGraphicFramePr>
               <p:cNvPr id="7" name="Tabelle 8">
@@ -26095,7 +26145,7 @@
               <p:nvPr>
                 <p:extLst>
                   <p:ext uri="{D42A27DB-BD31-4B8C-83A1-F6EECF244321}">
-                    <p14:modId xmlns:p14="http://schemas.microsoft.com/office/powerpoint/2010/main" val="1388748266"/>
+                    <p14:modId xmlns:p14="http://schemas.microsoft.com/office/powerpoint/2010/main" val="190012407"/>
                   </p:ext>
                 </p:extLst>
               </p:nvPr>
@@ -26176,7 +26226,7 @@
                           <a:pPr algn="ctr"/>
                           <a:r>
                             <a:rPr lang="de-DE" sz="1300" dirty="0"/>
-                            <a:t>0,5</a:t>
+                            <a:t>0.5</a:t>
                           </a:r>
                         </a:p>
                       </a:txBody>
@@ -26190,7 +26240,7 @@
                           <a:pPr algn="ctr"/>
                           <a:r>
                             <a:rPr lang="de-DE" sz="1300" dirty="0"/>
-                            <a:t>0,5</a:t>
+                            <a:t>0.5</a:t>
                           </a:r>
                         </a:p>
                       </a:txBody>
@@ -26208,8 +26258,8 @@
           </p:graphicFrame>
         </mc:Fallback>
       </mc:AlternateContent>
-      <mc:AlternateContent xmlns:mc="http://schemas.openxmlformats.org/markup-compatibility/2006" xmlns:a14="http://schemas.microsoft.com/office/drawing/2010/main">
-        <mc:Choice Requires="a14">
+      <mc:AlternateContent xmlns:mc="http://schemas.openxmlformats.org/markup-compatibility/2006">
+        <mc:Choice xmlns:a14="http://schemas.microsoft.com/office/drawing/2010/main" Requires="a14">
           <p:graphicFrame>
             <p:nvGraphicFramePr>
               <p:cNvPr id="26" name="Tabelle 8">
@@ -26225,7 +26275,7 @@
               <p:nvPr>
                 <p:extLst>
                   <p:ext uri="{D42A27DB-BD31-4B8C-83A1-F6EECF244321}">
-                    <p14:modId xmlns:p14="http://schemas.microsoft.com/office/powerpoint/2010/main" val="2028739782"/>
+                    <p14:modId xmlns:p14="http://schemas.microsoft.com/office/powerpoint/2010/main" val="1030987043"/>
                   </p:ext>
                 </p:extLst>
               </p:nvPr>
@@ -26514,7 +26564,7 @@
                           <a:pPr algn="ctr"/>
                           <a:r>
                             <a:rPr lang="en-GB" sz="1300" noProof="0" dirty="0"/>
-                            <a:t>0,9</a:t>
+                            <a:t>0.9</a:t>
                           </a:r>
                         </a:p>
                       </a:txBody>
@@ -26528,7 +26578,7 @@
                           <a:pPr algn="ctr"/>
                           <a:r>
                             <a:rPr lang="en-GB" sz="1300" noProof="0" dirty="0"/>
-                            <a:t>0,1</a:t>
+                            <a:t>0.1</a:t>
                           </a:r>
                         </a:p>
                       </a:txBody>
@@ -26563,7 +26613,7 @@
                           <a:pPr algn="ctr"/>
                           <a:r>
                             <a:rPr lang="en-GB" sz="1300" noProof="0" dirty="0"/>
-                            <a:t>0,1</a:t>
+                            <a:t>0.1</a:t>
                           </a:r>
                         </a:p>
                       </a:txBody>
@@ -26577,7 +26627,7 @@
                           <a:pPr algn="ctr"/>
                           <a:r>
                             <a:rPr lang="en-GB" sz="1300" noProof="0" dirty="0"/>
-                            <a:t>0,9</a:t>
+                            <a:t>0.9</a:t>
                           </a:r>
                         </a:p>
                       </a:txBody>
@@ -26594,7 +26644,7 @@
             </a:graphic>
           </p:graphicFrame>
         </mc:Choice>
-        <mc:Fallback xmlns="">
+        <mc:Fallback>
           <p:graphicFrame>
             <p:nvGraphicFramePr>
               <p:cNvPr id="26" name="Tabelle 8">
@@ -26610,7 +26660,7 @@
               <p:nvPr>
                 <p:extLst>
                   <p:ext uri="{D42A27DB-BD31-4B8C-83A1-F6EECF244321}">
-                    <p14:modId xmlns:p14="http://schemas.microsoft.com/office/powerpoint/2010/main" val="2028739782"/>
+                    <p14:modId xmlns:p14="http://schemas.microsoft.com/office/powerpoint/2010/main" val="1030987043"/>
                   </p:ext>
                 </p:extLst>
               </p:nvPr>
@@ -26729,7 +26779,7 @@
                           <a:pPr algn="ctr"/>
                           <a:r>
                             <a:rPr lang="en-GB" sz="1300" noProof="0" dirty="0"/>
-                            <a:t>0,9</a:t>
+                            <a:t>0.9</a:t>
                           </a:r>
                         </a:p>
                       </a:txBody>
@@ -26743,7 +26793,7 @@
                           <a:pPr algn="ctr"/>
                           <a:r>
                             <a:rPr lang="en-GB" sz="1300" noProof="0" dirty="0"/>
-                            <a:t>0,1</a:t>
+                            <a:t>0.1</a:t>
                           </a:r>
                         </a:p>
                       </a:txBody>
@@ -26778,7 +26828,7 @@
                           <a:pPr algn="ctr"/>
                           <a:r>
                             <a:rPr lang="en-GB" sz="1300" noProof="0" dirty="0"/>
-                            <a:t>0,1</a:t>
+                            <a:t>0.1</a:t>
                           </a:r>
                         </a:p>
                       </a:txBody>
@@ -26792,7 +26842,7 @@
                           <a:pPr algn="ctr"/>
                           <a:r>
                             <a:rPr lang="en-GB" sz="1300" noProof="0" dirty="0"/>
-                            <a:t>0,9</a:t>
+                            <a:t>0.9</a:t>
                           </a:r>
                         </a:p>
                       </a:txBody>
@@ -26810,8 +26860,8 @@
           </p:graphicFrame>
         </mc:Fallback>
       </mc:AlternateContent>
-      <mc:AlternateContent xmlns:mc="http://schemas.openxmlformats.org/markup-compatibility/2006" xmlns:a14="http://schemas.microsoft.com/office/drawing/2010/main">
-        <mc:Choice Requires="a14">
+      <mc:AlternateContent xmlns:mc="http://schemas.openxmlformats.org/markup-compatibility/2006">
+        <mc:Choice xmlns:a14="http://schemas.microsoft.com/office/drawing/2010/main" Requires="a14">
           <p:graphicFrame>
             <p:nvGraphicFramePr>
               <p:cNvPr id="28" name="Tabelle 8">
@@ -26827,7 +26877,7 @@
               <p:nvPr>
                 <p:extLst>
                   <p:ext uri="{D42A27DB-BD31-4B8C-83A1-F6EECF244321}">
-                    <p14:modId xmlns:p14="http://schemas.microsoft.com/office/powerpoint/2010/main" val="1992294875"/>
+                    <p14:modId xmlns:p14="http://schemas.microsoft.com/office/powerpoint/2010/main" val="3643574514"/>
                   </p:ext>
                 </p:extLst>
               </p:nvPr>
@@ -27186,7 +27236,7 @@
                           <a:pPr algn="ctr"/>
                           <a:r>
                             <a:rPr lang="en-GB" sz="1300" noProof="0" dirty="0"/>
-                            <a:t>1,0</a:t>
+                            <a:t>1.0</a:t>
                           </a:r>
                         </a:p>
                       </a:txBody>
@@ -27249,7 +27299,7 @@
                           <a:pPr algn="ctr"/>
                           <a:r>
                             <a:rPr lang="en-GB" sz="1300" noProof="0" dirty="0"/>
-                            <a:t>0,9</a:t>
+                            <a:t>0.9</a:t>
                           </a:r>
                         </a:p>
                       </a:txBody>
@@ -27263,7 +27313,7 @@
                           <a:pPr algn="ctr"/>
                           <a:r>
                             <a:rPr lang="en-GB" sz="1300" noProof="0" dirty="0"/>
-                            <a:t>0,1</a:t>
+                            <a:t>0.1</a:t>
                           </a:r>
                         </a:p>
                       </a:txBody>
@@ -27312,7 +27362,7 @@
                           <a:pPr algn="ctr"/>
                           <a:r>
                             <a:rPr lang="en-GB" sz="1300" noProof="0" dirty="0"/>
-                            <a:t>0,9</a:t>
+                            <a:t>0.9</a:t>
                           </a:r>
                         </a:p>
                       </a:txBody>
@@ -27326,7 +27376,7 @@
                           <a:pPr algn="ctr"/>
                           <a:r>
                             <a:rPr lang="en-GB" sz="1300" noProof="0" dirty="0"/>
-                            <a:t>0,1</a:t>
+                            <a:t>0.1</a:t>
                           </a:r>
                         </a:p>
                       </a:txBody>
@@ -27375,7 +27425,7 @@
                           <a:pPr algn="ctr"/>
                           <a:r>
                             <a:rPr lang="en-GB" sz="1300" noProof="0" dirty="0"/>
-                            <a:t>0,01</a:t>
+                            <a:t>0.01</a:t>
                           </a:r>
                         </a:p>
                       </a:txBody>
@@ -27389,7 +27439,7 @@
                           <a:pPr algn="ctr"/>
                           <a:r>
                             <a:rPr lang="en-GB" sz="1300" noProof="0" dirty="0"/>
-                            <a:t>0,99</a:t>
+                            <a:t>0.99</a:t>
                           </a:r>
                         </a:p>
                       </a:txBody>
@@ -27406,7 +27456,7 @@
             </a:graphic>
           </p:graphicFrame>
         </mc:Choice>
-        <mc:Fallback xmlns="">
+        <mc:Fallback>
           <p:graphicFrame>
             <p:nvGraphicFramePr>
               <p:cNvPr id="28" name="Tabelle 8">
@@ -27422,7 +27472,7 @@
               <p:nvPr>
                 <p:extLst>
                   <p:ext uri="{D42A27DB-BD31-4B8C-83A1-F6EECF244321}">
-                    <p14:modId xmlns:p14="http://schemas.microsoft.com/office/powerpoint/2010/main" val="1992294875"/>
+                    <p14:modId xmlns:p14="http://schemas.microsoft.com/office/powerpoint/2010/main" val="3643574514"/>
                   </p:ext>
                 </p:extLst>
               </p:nvPr>
@@ -27579,7 +27629,7 @@
                           <a:pPr algn="ctr"/>
                           <a:r>
                             <a:rPr lang="en-GB" sz="1300" noProof="0" dirty="0"/>
-                            <a:t>1,0</a:t>
+                            <a:t>1.0</a:t>
                           </a:r>
                         </a:p>
                       </a:txBody>
@@ -27642,7 +27692,7 @@
                           <a:pPr algn="ctr"/>
                           <a:r>
                             <a:rPr lang="en-GB" sz="1300" noProof="0" dirty="0"/>
-                            <a:t>0,9</a:t>
+                            <a:t>0.9</a:t>
                           </a:r>
                         </a:p>
                       </a:txBody>
@@ -27656,7 +27706,7 @@
                           <a:pPr algn="ctr"/>
                           <a:r>
                             <a:rPr lang="en-GB" sz="1300" noProof="0" dirty="0"/>
-                            <a:t>0,1</a:t>
+                            <a:t>0.1</a:t>
                           </a:r>
                         </a:p>
                       </a:txBody>
@@ -27705,7 +27755,7 @@
                           <a:pPr algn="ctr"/>
                           <a:r>
                             <a:rPr lang="en-GB" sz="1300" noProof="0" dirty="0"/>
-                            <a:t>0,9</a:t>
+                            <a:t>0.9</a:t>
                           </a:r>
                         </a:p>
                       </a:txBody>
@@ -27719,7 +27769,7 @@
                           <a:pPr algn="ctr"/>
                           <a:r>
                             <a:rPr lang="en-GB" sz="1300" noProof="0" dirty="0"/>
-                            <a:t>0,1</a:t>
+                            <a:t>0.1</a:t>
                           </a:r>
                         </a:p>
                       </a:txBody>
@@ -27768,7 +27818,7 @@
                           <a:pPr algn="ctr"/>
                           <a:r>
                             <a:rPr lang="en-GB" sz="1300" noProof="0" dirty="0"/>
-                            <a:t>0,01</a:t>
+                            <a:t>0.01</a:t>
                           </a:r>
                         </a:p>
                       </a:txBody>
@@ -27782,7 +27832,7 @@
                           <a:pPr algn="ctr"/>
                           <a:r>
                             <a:rPr lang="en-GB" sz="1300" noProof="0" dirty="0"/>
-                            <a:t>0,99</a:t>
+                            <a:t>0.99</a:t>
                           </a:r>
                         </a:p>
                       </a:txBody>
@@ -28072,8 +28122,8 @@
           <a:chExt cx="0" cy="0"/>
         </a:xfrm>
       </p:grpSpPr>
-      <mc:AlternateContent xmlns:mc="http://schemas.openxmlformats.org/markup-compatibility/2006">
-        <mc:Choice xmlns:a14="http://schemas.microsoft.com/office/drawing/2010/main" Requires="a14">
+      <mc:AlternateContent xmlns:mc="http://schemas.openxmlformats.org/markup-compatibility/2006" xmlns:a14="http://schemas.microsoft.com/office/drawing/2010/main">
+        <mc:Choice Requires="a14">
           <p:sp>
             <p:nvSpPr>
               <p:cNvPr id="9219" name="Rectangle 3"/>
@@ -28348,7 +28398,7 @@
             </p:txBody>
           </p:sp>
         </mc:Choice>
-        <mc:Fallback>
+        <mc:Fallback xmlns="">
           <p:sp>
             <p:nvSpPr>
               <p:cNvPr id="9219" name="Rectangle 3"/>
@@ -30692,8 +30742,8 @@
           </a:p>
         </p:txBody>
       </p:sp>
-      <mc:AlternateContent xmlns:mc="http://schemas.openxmlformats.org/markup-compatibility/2006">
-        <mc:Choice xmlns:a14="http://schemas.microsoft.com/office/drawing/2010/main" Requires="a14">
+      <mc:AlternateContent xmlns:mc="http://schemas.openxmlformats.org/markup-compatibility/2006" xmlns:a14="http://schemas.microsoft.com/office/drawing/2010/main">
+        <mc:Choice Requires="a14">
           <p:sp>
             <p:nvSpPr>
               <p:cNvPr id="21" name="Textfeld 20">
@@ -31742,7 +31792,7 @@
             </p:txBody>
           </p:sp>
         </mc:Choice>
-        <mc:Fallback>
+        <mc:Fallback xmlns="">
           <p:sp>
             <p:nvSpPr>
               <p:cNvPr id="21" name="Textfeld 20">
@@ -32529,8 +32579,8 @@
           </a:p>
         </p:txBody>
       </p:sp>
-      <mc:AlternateContent xmlns:mc="http://schemas.openxmlformats.org/markup-compatibility/2006">
-        <mc:Choice xmlns:a14="http://schemas.microsoft.com/office/drawing/2010/main" Requires="a14">
+      <mc:AlternateContent xmlns:mc="http://schemas.openxmlformats.org/markup-compatibility/2006" xmlns:a14="http://schemas.microsoft.com/office/drawing/2010/main">
+        <mc:Choice Requires="a14">
           <p:sp>
             <p:nvSpPr>
               <p:cNvPr id="9" name="Textfeld 8">
@@ -33270,16 +33320,7 @@
                             </a:solidFill>
                             <a:latin typeface="Cambria Math" panose="02040503050406030204" pitchFamily="18" charset="0"/>
                           </a:rPr>
-                          <m:t>=</m:t>
-                        </m:r>
-                        <m:r>
-                          <a:rPr lang="en-AU" smtClean="0">
-                            <a:solidFill>
-                              <a:srgbClr val="000000"/>
-                            </a:solidFill>
-                            <a:latin typeface="Cambria Math" panose="02040503050406030204" pitchFamily="18" charset="0"/>
-                          </a:rPr>
-                          <m:t>0</m:t>
+                          <m:t>=0</m:t>
                         </m:r>
                       </m:e>
                     </m:d>
@@ -33332,16 +33373,7 @@
                             </a:solidFill>
                             <a:latin typeface="Cambria Math" panose="02040503050406030204" pitchFamily="18" charset="0"/>
                           </a:rPr>
-                          <m:t>=</m:t>
-                        </m:r>
-                        <m:r>
-                          <a:rPr lang="en-AU" smtClean="0">
-                            <a:solidFill>
-                              <a:srgbClr val="000000"/>
-                            </a:solidFill>
-                            <a:latin typeface="Cambria Math" panose="02040503050406030204" pitchFamily="18" charset="0"/>
-                          </a:rPr>
-                          <m:t>0</m:t>
+                          <m:t>=0</m:t>
                         </m:r>
                       </m:e>
                     </m:d>
@@ -33391,25 +33423,7 @@
                         </a:solidFill>
                         <a:latin typeface="Cambria Math" panose="02040503050406030204" pitchFamily="18" charset="0"/>
                       </a:rPr>
-                      <m:t>=</m:t>
-                    </m:r>
-                    <m:r>
-                      <a:rPr lang="en-AU" smtClean="0">
-                        <a:solidFill>
-                          <a:srgbClr val="000000"/>
-                        </a:solidFill>
-                        <a:latin typeface="Cambria Math" panose="02040503050406030204" pitchFamily="18" charset="0"/>
-                      </a:rPr>
-                      <m:t>0</m:t>
-                    </m:r>
-                    <m:r>
-                      <a:rPr lang="en-AU" smtClean="0">
-                        <a:solidFill>
-                          <a:srgbClr val="000000"/>
-                        </a:solidFill>
-                        <a:latin typeface="Cambria Math" panose="02040503050406030204" pitchFamily="18" charset="0"/>
-                      </a:rPr>
-                      <m:t>|</m:t>
+                      <m:t>=0|</m:t>
                     </m:r>
                     <m:r>
                       <a:rPr lang="en-AU" smtClean="0">
@@ -33427,25 +33441,7 @@
                         </a:solidFill>
                         <a:latin typeface="Cambria Math" panose="02040503050406030204" pitchFamily="18" charset="0"/>
                       </a:rPr>
-                      <m:t>=</m:t>
-                    </m:r>
-                    <m:r>
-                      <a:rPr lang="en-AU" smtClean="0">
-                        <a:solidFill>
-                          <a:srgbClr val="000000"/>
-                        </a:solidFill>
-                        <a:latin typeface="Cambria Math" panose="02040503050406030204" pitchFamily="18" charset="0"/>
-                      </a:rPr>
-                      <m:t>0</m:t>
-                    </m:r>
-                    <m:r>
-                      <a:rPr lang="en-AU" smtClean="0">
-                        <a:solidFill>
-                          <a:srgbClr val="000000"/>
-                        </a:solidFill>
-                        <a:latin typeface="Cambria Math" panose="02040503050406030204" pitchFamily="18" charset="0"/>
-                      </a:rPr>
-                      <m:t>,</m:t>
+                      <m:t>=0,</m:t>
                     </m:r>
                     <m:r>
                       <m:rPr>
@@ -33466,25 +33462,7 @@
                         </a:solidFill>
                         <a:latin typeface="Cambria Math" panose="02040503050406030204" pitchFamily="18" charset="0"/>
                       </a:rPr>
-                      <m:t>=</m:t>
-                    </m:r>
-                    <m:r>
-                      <a:rPr lang="en-AU" smtClean="0">
-                        <a:solidFill>
-                          <a:srgbClr val="000000"/>
-                        </a:solidFill>
-                        <a:latin typeface="Cambria Math" panose="02040503050406030204" pitchFamily="18" charset="0"/>
-                      </a:rPr>
-                      <m:t>0</m:t>
-                    </m:r>
-                    <m:r>
-                      <a:rPr lang="en-AU" smtClean="0">
-                        <a:solidFill>
-                          <a:srgbClr val="000000"/>
-                        </a:solidFill>
-                        <a:latin typeface="Cambria Math" panose="02040503050406030204" pitchFamily="18" charset="0"/>
-                      </a:rPr>
-                      <m:t>)</m:t>
+                      <m:t>=0)</m:t>
                     </m:r>
                   </m:oMath>
                 </a14:m>
@@ -33544,16 +33522,7 @@
                             </a:solidFill>
                             <a:latin typeface="Cambria Math" panose="02040503050406030204" pitchFamily="18" charset="0"/>
                           </a:rPr>
-                          <m:t>=</m:t>
-                        </m:r>
-                        <m:r>
-                          <a:rPr lang="en-AU" smtClean="0">
-                            <a:solidFill>
-                              <a:srgbClr val="000000"/>
-                            </a:solidFill>
-                            <a:latin typeface="Cambria Math" panose="02040503050406030204" pitchFamily="18" charset="0"/>
-                          </a:rPr>
-                          <m:t>1</m:t>
+                          <m:t>=1</m:t>
                         </m:r>
                       </m:e>
                     </m:d>
@@ -33606,16 +33575,7 @@
                             </a:solidFill>
                             <a:latin typeface="Cambria Math" panose="02040503050406030204" pitchFamily="18" charset="0"/>
                           </a:rPr>
-                          <m:t>=</m:t>
-                        </m:r>
-                        <m:r>
-                          <a:rPr lang="en-AU" smtClean="0">
-                            <a:solidFill>
-                              <a:srgbClr val="000000"/>
-                            </a:solidFill>
-                            <a:latin typeface="Cambria Math" panose="02040503050406030204" pitchFamily="18" charset="0"/>
-                          </a:rPr>
-                          <m:t>0</m:t>
+                          <m:t>=0</m:t>
                         </m:r>
                       </m:e>
                     </m:d>
@@ -33665,25 +33625,7 @@
                         </a:solidFill>
                         <a:latin typeface="Cambria Math" panose="02040503050406030204" pitchFamily="18" charset="0"/>
                       </a:rPr>
-                      <m:t>=</m:t>
-                    </m:r>
-                    <m:r>
-                      <a:rPr lang="en-AU" smtClean="0">
-                        <a:solidFill>
-                          <a:srgbClr val="000000"/>
-                        </a:solidFill>
-                        <a:latin typeface="Cambria Math" panose="02040503050406030204" pitchFamily="18" charset="0"/>
-                      </a:rPr>
-                      <m:t>0</m:t>
-                    </m:r>
-                    <m:r>
-                      <a:rPr lang="en-AU" smtClean="0">
-                        <a:solidFill>
-                          <a:srgbClr val="000000"/>
-                        </a:solidFill>
-                        <a:latin typeface="Cambria Math" panose="02040503050406030204" pitchFamily="18" charset="0"/>
-                      </a:rPr>
-                      <m:t>|</m:t>
+                      <m:t>=0|</m:t>
                     </m:r>
                     <m:r>
                       <a:rPr lang="en-AU" smtClean="0">
@@ -33701,25 +33643,7 @@
                         </a:solidFill>
                         <a:latin typeface="Cambria Math" panose="02040503050406030204" pitchFamily="18" charset="0"/>
                       </a:rPr>
-                      <m:t>=</m:t>
-                    </m:r>
-                    <m:r>
-                      <a:rPr lang="en-AU" smtClean="0">
-                        <a:solidFill>
-                          <a:srgbClr val="000000"/>
-                        </a:solidFill>
-                        <a:latin typeface="Cambria Math" panose="02040503050406030204" pitchFamily="18" charset="0"/>
-                      </a:rPr>
-                      <m:t>1</m:t>
-                    </m:r>
-                    <m:r>
-                      <a:rPr lang="en-AU" smtClean="0">
-                        <a:solidFill>
-                          <a:srgbClr val="000000"/>
-                        </a:solidFill>
-                        <a:latin typeface="Cambria Math" panose="02040503050406030204" pitchFamily="18" charset="0"/>
-                      </a:rPr>
-                      <m:t>,</m:t>
+                      <m:t>=1,</m:t>
                     </m:r>
                     <m:r>
                       <m:rPr>
@@ -33740,25 +33664,7 @@
                         </a:solidFill>
                         <a:latin typeface="Cambria Math" panose="02040503050406030204" pitchFamily="18" charset="0"/>
                       </a:rPr>
-                      <m:t>=</m:t>
-                    </m:r>
-                    <m:r>
-                      <a:rPr lang="en-AU" smtClean="0">
-                        <a:solidFill>
-                          <a:srgbClr val="000000"/>
-                        </a:solidFill>
-                        <a:latin typeface="Cambria Math" panose="02040503050406030204" pitchFamily="18" charset="0"/>
-                      </a:rPr>
-                      <m:t>0</m:t>
-                    </m:r>
-                    <m:r>
-                      <a:rPr lang="en-AU" smtClean="0">
-                        <a:solidFill>
-                          <a:srgbClr val="000000"/>
-                        </a:solidFill>
-                        <a:latin typeface="Cambria Math" panose="02040503050406030204" pitchFamily="18" charset="0"/>
-                      </a:rPr>
-                      <m:t>)</m:t>
+                      <m:t>=0)</m:t>
                     </m:r>
                   </m:oMath>
                 </a14:m>
@@ -33818,16 +33724,7 @@
                             </a:solidFill>
                             <a:latin typeface="Cambria Math" panose="02040503050406030204" pitchFamily="18" charset="0"/>
                           </a:rPr>
-                          <m:t>=</m:t>
-                        </m:r>
-                        <m:r>
-                          <a:rPr lang="en-AU" smtClean="0">
-                            <a:solidFill>
-                              <a:srgbClr val="000000"/>
-                            </a:solidFill>
-                            <a:latin typeface="Cambria Math" panose="02040503050406030204" pitchFamily="18" charset="0"/>
-                          </a:rPr>
-                          <m:t>0</m:t>
+                          <m:t>=0</m:t>
                         </m:r>
                       </m:e>
                     </m:d>
@@ -33880,16 +33777,7 @@
                             </a:solidFill>
                             <a:latin typeface="Cambria Math" panose="02040503050406030204" pitchFamily="18" charset="0"/>
                           </a:rPr>
-                          <m:t>=</m:t>
-                        </m:r>
-                        <m:r>
-                          <a:rPr lang="en-AU" smtClean="0">
-                            <a:solidFill>
-                              <a:srgbClr val="000000"/>
-                            </a:solidFill>
-                            <a:latin typeface="Cambria Math" panose="02040503050406030204" pitchFamily="18" charset="0"/>
-                          </a:rPr>
-                          <m:t>1</m:t>
+                          <m:t>=1</m:t>
                         </m:r>
                       </m:e>
                     </m:d>
@@ -33939,25 +33827,7 @@
                         </a:solidFill>
                         <a:latin typeface="Cambria Math" panose="02040503050406030204" pitchFamily="18" charset="0"/>
                       </a:rPr>
-                      <m:t>=</m:t>
-                    </m:r>
-                    <m:r>
-                      <a:rPr lang="en-AU" smtClean="0">
-                        <a:solidFill>
-                          <a:srgbClr val="000000"/>
-                        </a:solidFill>
-                        <a:latin typeface="Cambria Math" panose="02040503050406030204" pitchFamily="18" charset="0"/>
-                      </a:rPr>
-                      <m:t>0</m:t>
-                    </m:r>
-                    <m:r>
-                      <a:rPr lang="en-AU" smtClean="0">
-                        <a:solidFill>
-                          <a:srgbClr val="000000"/>
-                        </a:solidFill>
-                        <a:latin typeface="Cambria Math" panose="02040503050406030204" pitchFamily="18" charset="0"/>
-                      </a:rPr>
-                      <m:t>|</m:t>
+                      <m:t>=0|</m:t>
                     </m:r>
                     <m:r>
                       <a:rPr lang="en-AU" smtClean="0">
@@ -33975,25 +33845,7 @@
                         </a:solidFill>
                         <a:latin typeface="Cambria Math" panose="02040503050406030204" pitchFamily="18" charset="0"/>
                       </a:rPr>
-                      <m:t>=</m:t>
-                    </m:r>
-                    <m:r>
-                      <a:rPr lang="en-AU" smtClean="0">
-                        <a:solidFill>
-                          <a:srgbClr val="000000"/>
-                        </a:solidFill>
-                        <a:latin typeface="Cambria Math" panose="02040503050406030204" pitchFamily="18" charset="0"/>
-                      </a:rPr>
-                      <m:t>0</m:t>
-                    </m:r>
-                    <m:r>
-                      <a:rPr lang="en-AU" smtClean="0">
-                        <a:solidFill>
-                          <a:srgbClr val="000000"/>
-                        </a:solidFill>
-                        <a:latin typeface="Cambria Math" panose="02040503050406030204" pitchFamily="18" charset="0"/>
-                      </a:rPr>
-                      <m:t>,</m:t>
+                      <m:t>=0,</m:t>
                     </m:r>
                     <m:r>
                       <m:rPr>
@@ -34014,25 +33866,7 @@
                         </a:solidFill>
                         <a:latin typeface="Cambria Math" panose="02040503050406030204" pitchFamily="18" charset="0"/>
                       </a:rPr>
-                      <m:t>=</m:t>
-                    </m:r>
-                    <m:r>
-                      <a:rPr lang="en-AU" smtClean="0">
-                        <a:solidFill>
-                          <a:srgbClr val="000000"/>
-                        </a:solidFill>
-                        <a:latin typeface="Cambria Math" panose="02040503050406030204" pitchFamily="18" charset="0"/>
-                      </a:rPr>
-                      <m:t>1</m:t>
-                    </m:r>
-                    <m:r>
-                      <a:rPr lang="en-AU" smtClean="0">
-                        <a:solidFill>
-                          <a:srgbClr val="000000"/>
-                        </a:solidFill>
-                        <a:latin typeface="Cambria Math" panose="02040503050406030204" pitchFamily="18" charset="0"/>
-                      </a:rPr>
-                      <m:t>)</m:t>
+                      <m:t>=1)</m:t>
                     </m:r>
                   </m:oMath>
                 </a14:m>
@@ -34096,16 +33930,7 @@
                               </a:solidFill>
                               <a:latin typeface="Cambria Math" panose="02040503050406030204" pitchFamily="18" charset="0"/>
                             </a:rPr>
-                            <m:t>=</m:t>
-                          </m:r>
-                          <m:r>
-                            <a:rPr lang="en-AU" smtClean="0">
-                              <a:solidFill>
-                                <a:srgbClr val="000000"/>
-                              </a:solidFill>
-                              <a:latin typeface="Cambria Math" panose="02040503050406030204" pitchFamily="18" charset="0"/>
-                            </a:rPr>
-                            <m:t>1</m:t>
+                            <m:t>=1</m:t>
                           </m:r>
                         </m:e>
                       </m:d>
@@ -34158,16 +33983,7 @@
                               </a:solidFill>
                               <a:latin typeface="Cambria Math" panose="02040503050406030204" pitchFamily="18" charset="0"/>
                             </a:rPr>
-                            <m:t>=</m:t>
-                          </m:r>
-                          <m:r>
-                            <a:rPr lang="en-AU" smtClean="0">
-                              <a:solidFill>
-                                <a:srgbClr val="000000"/>
-                              </a:solidFill>
-                              <a:latin typeface="Cambria Math" panose="02040503050406030204" pitchFamily="18" charset="0"/>
-                            </a:rPr>
-                            <m:t>1</m:t>
+                            <m:t>=1</m:t>
                           </m:r>
                         </m:e>
                       </m:d>
@@ -34217,25 +34033,7 @@
                           </a:solidFill>
                           <a:latin typeface="Cambria Math" panose="02040503050406030204" pitchFamily="18" charset="0"/>
                         </a:rPr>
-                        <m:t>=</m:t>
-                      </m:r>
-                      <m:r>
-                        <a:rPr lang="en-AU" smtClean="0">
-                          <a:solidFill>
-                            <a:srgbClr val="000000"/>
-                          </a:solidFill>
-                          <a:latin typeface="Cambria Math" panose="02040503050406030204" pitchFamily="18" charset="0"/>
-                        </a:rPr>
-                        <m:t>0</m:t>
-                      </m:r>
-                      <m:r>
-                        <a:rPr lang="en-AU" smtClean="0">
-                          <a:solidFill>
-                            <a:srgbClr val="000000"/>
-                          </a:solidFill>
-                          <a:latin typeface="Cambria Math" panose="02040503050406030204" pitchFamily="18" charset="0"/>
-                        </a:rPr>
-                        <m:t>|</m:t>
+                        <m:t>=0|</m:t>
                       </m:r>
                       <m:r>
                         <a:rPr lang="en-AU" smtClean="0">
@@ -34253,25 +34051,7 @@
                           </a:solidFill>
                           <a:latin typeface="Cambria Math" panose="02040503050406030204" pitchFamily="18" charset="0"/>
                         </a:rPr>
-                        <m:t>=</m:t>
-                      </m:r>
-                      <m:r>
-                        <a:rPr lang="en-AU" smtClean="0">
-                          <a:solidFill>
-                            <a:srgbClr val="000000"/>
-                          </a:solidFill>
-                          <a:latin typeface="Cambria Math" panose="02040503050406030204" pitchFamily="18" charset="0"/>
-                        </a:rPr>
-                        <m:t>1</m:t>
-                      </m:r>
-                      <m:r>
-                        <a:rPr lang="en-AU" smtClean="0">
-                          <a:solidFill>
-                            <a:srgbClr val="000000"/>
-                          </a:solidFill>
-                          <a:latin typeface="Cambria Math" panose="02040503050406030204" pitchFamily="18" charset="0"/>
-                        </a:rPr>
-                        <m:t>,</m:t>
+                        <m:t>=1,</m:t>
                       </m:r>
                       <m:r>
                         <m:rPr>
@@ -34292,25 +34072,7 @@
                           </a:solidFill>
                           <a:latin typeface="Cambria Math" panose="02040503050406030204" pitchFamily="18" charset="0"/>
                         </a:rPr>
-                        <m:t>=</m:t>
-                      </m:r>
-                      <m:r>
-                        <a:rPr lang="en-AU" smtClean="0">
-                          <a:solidFill>
-                            <a:srgbClr val="000000"/>
-                          </a:solidFill>
-                          <a:latin typeface="Cambria Math" panose="02040503050406030204" pitchFamily="18" charset="0"/>
-                        </a:rPr>
-                        <m:t>1</m:t>
-                      </m:r>
-                      <m:r>
-                        <a:rPr lang="en-AU" smtClean="0">
-                          <a:solidFill>
-                            <a:srgbClr val="000000"/>
-                          </a:solidFill>
-                          <a:latin typeface="Cambria Math" panose="02040503050406030204" pitchFamily="18" charset="0"/>
-                        </a:rPr>
-                        <m:t>)</m:t>
+                        <m:t>=1)</m:t>
                       </m:r>
                     </m:oMath>
                   </m:oMathPara>
@@ -34374,7 +34136,7 @@
             </p:txBody>
           </p:sp>
         </mc:Choice>
-        <mc:Fallback>
+        <mc:Fallback xmlns="">
           <p:sp>
             <p:nvSpPr>
               <p:cNvPr id="9" name="Textfeld 8">
@@ -34763,8 +34525,8 @@
           <a:chExt cx="0" cy="0"/>
         </a:xfrm>
       </p:grpSpPr>
-      <mc:AlternateContent xmlns:mc="http://schemas.openxmlformats.org/markup-compatibility/2006">
-        <mc:Choice xmlns:a14="http://schemas.microsoft.com/office/drawing/2010/main" Requires="a14">
+      <mc:AlternateContent xmlns:mc="http://schemas.openxmlformats.org/markup-compatibility/2006" xmlns:a14="http://schemas.microsoft.com/office/drawing/2010/main">
+        <mc:Choice Requires="a14">
           <p:sp>
             <p:nvSpPr>
               <p:cNvPr id="21" name="Textfeld 20">
@@ -36647,7 +36409,7 @@
             </p:txBody>
           </p:sp>
         </mc:Choice>
-        <mc:Fallback>
+        <mc:Fallback xmlns="">
           <p:sp>
             <p:nvSpPr>
               <p:cNvPr id="21" name="Textfeld 20">

</xml_diff>